<commit_message>
Add ending slide to ppt
</commit_message>
<xml_diff>
--- a/Docs/Presentation/Software Engineering II Project.pptx
+++ b/Docs/Presentation/Software Engineering II Project.pptx
@@ -5,10 +5,10 @@
     <p:sldMasterId id="2147483696" r:id="rId2"/>
   </p:sldMasterIdLst>
   <p:notesMasterIdLst>
-    <p:notesMasterId r:id="rId17"/>
+    <p:notesMasterId r:id="rId18"/>
   </p:notesMasterIdLst>
   <p:handoutMasterIdLst>
-    <p:handoutMasterId r:id="rId18"/>
+    <p:handoutMasterId r:id="rId19"/>
   </p:handoutMasterIdLst>
   <p:sldIdLst>
     <p:sldId id="257" r:id="rId3"/>
@@ -25,6 +25,7 @@
     <p:sldId id="270" r:id="rId14"/>
     <p:sldId id="268" r:id="rId15"/>
     <p:sldId id="269" r:id="rId16"/>
+    <p:sldId id="272" r:id="rId17"/>
   </p:sldIdLst>
   <p:sldSz cx="9144000" cy="6858000" type="screen4x3"/>
   <p:notesSz cx="6858000" cy="9144000"/>
@@ -749,6 +750,95 @@
     <p:extLst>
       <p:ext uri="{BB962C8B-B14F-4D97-AF65-F5344CB8AC3E}">
         <p14:creationId xmlns:p14="http://schemas.microsoft.com/office/powerpoint/2010/main" val="2147974240"/>
+      </p:ext>
+    </p:extLst>
+  </p:cSld>
+  <p:clrMapOvr>
+    <a:masterClrMapping/>
+  </p:clrMapOvr>
+</p:notes>
+</file>
+
+<file path=ppt/notesSlides/notesSlide2.xml><?xml version="1.0" encoding="utf-8"?>
+<p:notes xmlns:a="http://schemas.openxmlformats.org/drawingml/2006/main" xmlns:r="http://schemas.openxmlformats.org/officeDocument/2006/relationships" xmlns:p="http://schemas.openxmlformats.org/presentationml/2006/main">
+  <p:cSld>
+    <p:spTree>
+      <p:nvGrpSpPr>
+        <p:cNvPr id="1" name=""/>
+        <p:cNvGrpSpPr/>
+        <p:nvPr/>
+      </p:nvGrpSpPr>
+      <p:grpSpPr>
+        <a:xfrm>
+          <a:off x="0" y="0"/>
+          <a:ext cx="0" cy="0"/>
+          <a:chOff x="0" y="0"/>
+          <a:chExt cx="0" cy="0"/>
+        </a:xfrm>
+      </p:grpSpPr>
+      <p:sp>
+        <p:nvSpPr>
+          <p:cNvPr id="2" name="Slide Image Placeholder 1"/>
+          <p:cNvSpPr>
+            <a:spLocks noGrp="1" noRot="1" noChangeAspect="1"/>
+          </p:cNvSpPr>
+          <p:nvPr>
+            <p:ph type="sldImg"/>
+          </p:nvPr>
+        </p:nvSpPr>
+        <p:spPr>
+          <a:xfrm>
+            <a:off x="1371600" y="1143000"/>
+            <a:ext cx="4114800" cy="3086100"/>
+          </a:xfrm>
+        </p:spPr>
+      </p:sp>
+      <p:sp>
+        <p:nvSpPr>
+          <p:cNvPr id="3" name="Notes Placeholder 2"/>
+          <p:cNvSpPr>
+            <a:spLocks noGrp="1"/>
+          </p:cNvSpPr>
+          <p:nvPr>
+            <p:ph type="body" idx="1"/>
+          </p:nvPr>
+        </p:nvSpPr>
+        <p:spPr/>
+        <p:txBody>
+          <a:bodyPr/>
+          <a:lstStyle/>
+          <a:p>
+            <a:endParaRPr lang="en-US"/>
+          </a:p>
+        </p:txBody>
+      </p:sp>
+      <p:sp>
+        <p:nvSpPr>
+          <p:cNvPr id="4" name="Slide Number Placeholder 3"/>
+          <p:cNvSpPr>
+            <a:spLocks noGrp="1"/>
+          </p:cNvSpPr>
+          <p:nvPr>
+            <p:ph type="sldNum" sz="quarter" idx="10"/>
+          </p:nvPr>
+        </p:nvSpPr>
+        <p:spPr/>
+        <p:txBody>
+          <a:bodyPr/>
+          <a:lstStyle/>
+          <a:p>
+            <a:fld id="{32674CE4-FBD8-4481-AEFB-CA53E599A745}" type="slidenum">
+              <a:rPr lang="en-US" smtClean="0"/>
+              <a:t>15</a:t>
+            </a:fld>
+            <a:endParaRPr lang="en-US"/>
+          </a:p>
+        </p:txBody>
+      </p:sp>
+    </p:spTree>
+    <p:extLst>
+      <p:ext uri="{BB962C8B-B14F-4D97-AF65-F5344CB8AC3E}">
+        <p14:creationId xmlns:p14="http://schemas.microsoft.com/office/powerpoint/2010/main" val="630668850"/>
       </p:ext>
     </p:extLst>
   </p:cSld>
@@ -5958,6 +6048,190 @@
     <p:extLst>
       <p:ext uri="{BB962C8B-B14F-4D97-AF65-F5344CB8AC3E}">
         <p14:creationId xmlns:p14="http://schemas.microsoft.com/office/powerpoint/2010/main" val="1907887232"/>
+      </p:ext>
+    </p:extLst>
+  </p:cSld>
+  <p:clrMapOvr>
+    <a:masterClrMapping/>
+  </p:clrMapOvr>
+  <mc:AlternateContent xmlns:mc="http://schemas.openxmlformats.org/markup-compatibility/2006" xmlns:p14="http://schemas.microsoft.com/office/powerpoint/2010/main">
+    <mc:Choice Requires="p14">
+      <p:transition spd="med" p14:dur="700">
+        <p:fade/>
+      </p:transition>
+    </mc:Choice>
+    <mc:Fallback xmlns="">
+      <p:transition spd="med">
+        <p:fade/>
+      </p:transition>
+    </mc:Fallback>
+  </mc:AlternateContent>
+  <p:timing>
+    <p:tnLst>
+      <p:par>
+        <p:cTn id="1" dur="indefinite" restart="never" nodeType="tmRoot"/>
+      </p:par>
+    </p:tnLst>
+  </p:timing>
+</p:sld>
+</file>
+
+<file path=ppt/slides/slide15.xml><?xml version="1.0" encoding="utf-8"?>
+<p:sld xmlns:a="http://schemas.openxmlformats.org/drawingml/2006/main" xmlns:r="http://schemas.openxmlformats.org/officeDocument/2006/relationships" xmlns:p="http://schemas.openxmlformats.org/presentationml/2006/main">
+  <p:cSld>
+    <p:spTree>
+      <p:nvGrpSpPr>
+        <p:cNvPr id="1" name=""/>
+        <p:cNvGrpSpPr/>
+        <p:nvPr/>
+      </p:nvGrpSpPr>
+      <p:grpSpPr>
+        <a:xfrm>
+          <a:off x="0" y="0"/>
+          <a:ext cx="0" cy="0"/>
+          <a:chOff x="0" y="0"/>
+          <a:chExt cx="0" cy="0"/>
+        </a:xfrm>
+      </p:grpSpPr>
+      <p:sp>
+        <p:nvSpPr>
+          <p:cNvPr id="3" name="Subtitle 2"/>
+          <p:cNvSpPr>
+            <a:spLocks noGrp="1"/>
+          </p:cNvSpPr>
+          <p:nvPr>
+            <p:ph type="subTitle" idx="1"/>
+          </p:nvPr>
+        </p:nvSpPr>
+        <p:spPr>
+          <a:xfrm>
+            <a:off x="457199" y="3899938"/>
+            <a:ext cx="6433931" cy="2427710"/>
+          </a:xfrm>
+        </p:spPr>
+        <p:txBody>
+          <a:bodyPr>
+            <a:normAutofit/>
+          </a:bodyPr>
+          <a:lstStyle/>
+          <a:p>
+            <a:r>
+              <a:rPr lang="en-US" sz="2400" b="1" dirty="0" smtClean="0"/>
+              <a:t>Thank you</a:t>
+            </a:r>
+          </a:p>
+          <a:p>
+            <a:r>
+              <a:rPr lang="en-US" sz="2400" b="1" dirty="0" smtClean="0"/>
+              <a:t>For more information:</a:t>
+            </a:r>
+          </a:p>
+          <a:p>
+            <a:r>
+              <a:rPr lang="en-US" sz="2400" dirty="0"/>
+              <a:t>https://</a:t>
+            </a:r>
+            <a:r>
+              <a:rPr lang="en-US" sz="2400" dirty="0" err="1"/>
+              <a:t>github.com</a:t>
+            </a:r>
+            <a:r>
+              <a:rPr lang="en-US" sz="2400" dirty="0"/>
+              <a:t>/Nimita311/ENCA-</a:t>
+            </a:r>
+            <a:r>
+              <a:rPr lang="en-US" sz="2400" dirty="0" err="1"/>
+              <a:t>Andriod</a:t>
+            </a:r>
+            <a:endParaRPr lang="en-US" sz="2400" dirty="0"/>
+          </a:p>
+          <a:p>
+            <a:endParaRPr lang="en-US" sz="2400" dirty="0"/>
+          </a:p>
+        </p:txBody>
+      </p:sp>
+      <p:sp>
+        <p:nvSpPr>
+          <p:cNvPr id="2" name="Title 1"/>
+          <p:cNvSpPr>
+            <a:spLocks noGrp="1"/>
+          </p:cNvSpPr>
+          <p:nvPr>
+            <p:ph type="ctrTitle"/>
+          </p:nvPr>
+        </p:nvSpPr>
+        <p:spPr>
+          <a:xfrm>
+            <a:off x="457200" y="2266403"/>
+            <a:ext cx="8458200" cy="1470025"/>
+          </a:xfrm>
+        </p:spPr>
+        <p:txBody>
+          <a:bodyPr>
+            <a:normAutofit/>
+          </a:bodyPr>
+          <a:lstStyle/>
+          <a:p>
+            <a:r>
+              <a:rPr lang="en-US" sz="4000" dirty="0">
+                <a:latin typeface="+mn-lt"/>
+              </a:rPr>
+              <a:t>ENCA not Cleaning Agent</a:t>
+            </a:r>
+            <a:br>
+              <a:rPr lang="en-US" sz="4000" dirty="0">
+                <a:latin typeface="+mn-lt"/>
+              </a:rPr>
+            </a:br>
+            <a:r>
+              <a:rPr lang="en-US" altLang="zh-CN" sz="4000" dirty="0">
+                <a:latin typeface="+mn-lt"/>
+              </a:rPr>
+              <a:t>—— </a:t>
+            </a:r>
+            <a:r>
+              <a:rPr lang="en-US" sz="4000" dirty="0">
+                <a:latin typeface="+mn-lt"/>
+              </a:rPr>
+              <a:t>a cleaning agent picker</a:t>
+            </a:r>
+          </a:p>
+        </p:txBody>
+      </p:sp>
+      <p:sp>
+        <p:nvSpPr>
+          <p:cNvPr id="4" name="TextBox 3"/>
+          <p:cNvSpPr txBox="1"/>
+          <p:nvPr/>
+        </p:nvSpPr>
+        <p:spPr>
+          <a:xfrm>
+            <a:off x="7653516" y="5958316"/>
+            <a:ext cx="1261884" cy="369332"/>
+          </a:xfrm>
+          <a:prstGeom prst="rect">
+            <a:avLst/>
+          </a:prstGeom>
+          <a:noFill/>
+        </p:spPr>
+        <p:txBody>
+          <a:bodyPr wrap="none" rtlCol="0">
+            <a:spAutoFit/>
+          </a:bodyPr>
+          <a:lstStyle/>
+          <a:p>
+            <a:r>
+              <a:rPr lang="en-US" dirty="0" smtClean="0"/>
+              <a:t>20-07-2016</a:t>
+            </a:r>
+            <a:endParaRPr lang="en-US" dirty="0"/>
+          </a:p>
+        </p:txBody>
+      </p:sp>
+    </p:spTree>
+    <p:extLst>
+      <p:ext uri="{BB962C8B-B14F-4D97-AF65-F5344CB8AC3E}">
+        <p14:creationId xmlns:p14="http://schemas.microsoft.com/office/powerpoint/2010/main" val="1662981776"/>
       </p:ext>
     </p:extLst>
   </p:cSld>

</xml_diff>